<commit_message>
Ajout nom produit du graphique Top 50 CA
</commit_message>
<xml_diff>
--- a/Huang_Nicolas_2_Presentation_Bottleneck_102025.pptx
+++ b/Huang_Nicolas_2_Presentation_Bottleneck_102025.pptx
@@ -10649,10 +10649,10 @@
         </p:nvGrpSpPr>
         <p:grpSpPr>
           <a:xfrm rot="0">
-            <a:off x="-9525" y="-9525"/>
-            <a:ext cx="18307050" cy="2799450"/>
+            <a:off x="-19050" y="0"/>
+            <a:ext cx="18307050" cy="1872069"/>
             <a:chOff x="0" y="0"/>
-            <a:chExt cx="24409400" cy="3732600"/>
+            <a:chExt cx="24409400" cy="2496092"/>
           </a:xfrm>
         </p:grpSpPr>
         <p:sp>
@@ -10663,8 +10663,8 @@
           </p:nvSpPr>
           <p:spPr>
             <a:xfrm flipH="false" flipV="false" rot="0">
-              <a:off x="12700" y="12700"/>
-              <a:ext cx="24384000" cy="3707257"/>
+              <a:off x="12700" y="8493"/>
+              <a:ext cx="24384000" cy="2479145"/>
             </a:xfrm>
             <a:custGeom>
               <a:avLst/>
@@ -10673,7 +10673,7 @@
               <a:cxnLst/>
               <a:rect r="r" b="b" t="t" l="l"/>
               <a:pathLst>
-                <a:path h="3707257" w="24384000">
+                <a:path h="2479145" w="24384000">
                   <a:moveTo>
                     <a:pt x="0" y="0"/>
                   </a:moveTo>
@@ -10681,10 +10681,10 @@
                     <a:pt x="24384000" y="0"/>
                   </a:lnTo>
                   <a:lnTo>
-                    <a:pt x="24384000" y="3707257"/>
-                  </a:lnTo>
-                  <a:lnTo>
-                    <a:pt x="0" y="3707257"/>
+                    <a:pt x="24384000" y="2479144"/>
+                  </a:lnTo>
+                  <a:lnTo>
+                    <a:pt x="0" y="2479144"/>
                   </a:lnTo>
                   <a:close/>
                 </a:path>
@@ -10704,7 +10704,7 @@
           <p:spPr>
             <a:xfrm flipH="false" flipV="false" rot="0">
               <a:off x="0" y="0"/>
-              <a:ext cx="24409400" cy="3732657"/>
+              <a:ext cx="24409400" cy="2496149"/>
             </a:xfrm>
             <a:custGeom>
               <a:avLst/>
@@ -10713,7 +10713,7 @@
               <a:cxnLst/>
               <a:rect r="r" b="b" t="t" l="l"/>
               <a:pathLst>
-                <a:path h="3732657" w="24409400">
+                <a:path h="2496149" w="24409400">
                   <a:moveTo>
                     <a:pt x="12700" y="0"/>
                   </a:moveTo>
@@ -10722,71 +10722,71 @@
                   </a:lnTo>
                   <a:cubicBezTo>
                     <a:pt x="24403686" y="0"/>
-                    <a:pt x="24409400" y="5715"/>
-                    <a:pt x="24409400" y="12700"/>
+                    <a:pt x="24409400" y="3822"/>
+                    <a:pt x="24409400" y="8493"/>
                   </a:cubicBezTo>
                   <a:lnTo>
-                    <a:pt x="24409400" y="3719957"/>
+                    <a:pt x="24409400" y="2487637"/>
                   </a:lnTo>
                   <a:cubicBezTo>
-                    <a:pt x="24409400" y="3726942"/>
-                    <a:pt x="24403686" y="3732657"/>
-                    <a:pt x="24396700" y="3732657"/>
+                    <a:pt x="24409400" y="2492308"/>
+                    <a:pt x="24403686" y="2496149"/>
+                    <a:pt x="24396700" y="2496149"/>
                   </a:cubicBezTo>
                   <a:lnTo>
-                    <a:pt x="12700" y="3732657"/>
+                    <a:pt x="12700" y="2496149"/>
                   </a:lnTo>
                   <a:cubicBezTo>
-                    <a:pt x="5715" y="3732657"/>
-                    <a:pt x="0" y="3726942"/>
-                    <a:pt x="0" y="3719957"/>
+                    <a:pt x="5715" y="2496149"/>
+                    <a:pt x="0" y="2492308"/>
+                    <a:pt x="0" y="2487637"/>
                   </a:cubicBezTo>
                   <a:lnTo>
-                    <a:pt x="0" y="12700"/>
+                    <a:pt x="0" y="8493"/>
                   </a:lnTo>
                   <a:cubicBezTo>
-                    <a:pt x="0" y="5715"/>
+                    <a:pt x="0" y="3822"/>
                     <a:pt x="5715" y="0"/>
                     <a:pt x="12700" y="0"/>
                   </a:cubicBezTo>
                   <a:moveTo>
-                    <a:pt x="12700" y="25400"/>
+                    <a:pt x="12700" y="16986"/>
                   </a:moveTo>
                   <a:lnTo>
-                    <a:pt x="12700" y="12700"/>
-                  </a:lnTo>
-                  <a:lnTo>
-                    <a:pt x="25400" y="12700"/>
-                  </a:lnTo>
-                  <a:lnTo>
-                    <a:pt x="25400" y="3719957"/>
-                  </a:lnTo>
-                  <a:lnTo>
-                    <a:pt x="12700" y="3719957"/>
-                  </a:lnTo>
-                  <a:lnTo>
-                    <a:pt x="12700" y="3707257"/>
-                  </a:lnTo>
-                  <a:lnTo>
-                    <a:pt x="24396700" y="3707257"/>
-                  </a:lnTo>
-                  <a:lnTo>
-                    <a:pt x="24396700" y="3719957"/>
-                  </a:lnTo>
-                  <a:lnTo>
-                    <a:pt x="24384000" y="3719957"/>
-                  </a:lnTo>
-                  <a:lnTo>
-                    <a:pt x="24384000" y="12700"/>
-                  </a:lnTo>
-                  <a:lnTo>
-                    <a:pt x="24396700" y="12700"/>
-                  </a:lnTo>
-                  <a:lnTo>
-                    <a:pt x="24396700" y="25400"/>
-                  </a:lnTo>
-                  <a:lnTo>
-                    <a:pt x="12700" y="25400"/>
+                    <a:pt x="12700" y="8493"/>
+                  </a:lnTo>
+                  <a:lnTo>
+                    <a:pt x="25400" y="8493"/>
+                  </a:lnTo>
+                  <a:lnTo>
+                    <a:pt x="25400" y="2487637"/>
+                  </a:lnTo>
+                  <a:lnTo>
+                    <a:pt x="12700" y="2487637"/>
+                  </a:lnTo>
+                  <a:lnTo>
+                    <a:pt x="12700" y="2479145"/>
+                  </a:lnTo>
+                  <a:lnTo>
+                    <a:pt x="24396700" y="2479145"/>
+                  </a:lnTo>
+                  <a:lnTo>
+                    <a:pt x="24396700" y="2487637"/>
+                  </a:lnTo>
+                  <a:lnTo>
+                    <a:pt x="24384000" y="2487637"/>
+                  </a:lnTo>
+                  <a:lnTo>
+                    <a:pt x="24384000" y="8493"/>
+                  </a:lnTo>
+                  <a:lnTo>
+                    <a:pt x="24396700" y="8493"/>
+                  </a:lnTo>
+                  <a:lnTo>
+                    <a:pt x="24396700" y="16986"/>
+                  </a:lnTo>
+                  <a:lnTo>
+                    <a:pt x="12700" y="16986"/>
                   </a:lnTo>
                   <a:close/>
                 </a:path>
@@ -10861,8 +10861,8 @@
         </p:nvSpPr>
         <p:spPr>
           <a:xfrm flipH="false" flipV="false" rot="0">
-            <a:off x="1683692" y="2850647"/>
-            <a:ext cx="14913977" cy="7252123"/>
+            <a:off x="394996" y="1872069"/>
+            <a:ext cx="17259300" cy="8414931"/>
           </a:xfrm>
           <a:custGeom>
             <a:avLst/>
@@ -10871,18 +10871,18 @@
             <a:cxnLst/>
             <a:rect r="r" b="b" t="t" l="l"/>
             <a:pathLst>
-              <a:path h="7252123" w="14913977">
+              <a:path h="8414931" w="17259300">
                 <a:moveTo>
                   <a:pt x="0" y="0"/>
                 </a:moveTo>
                 <a:lnTo>
-                  <a:pt x="14913977" y="0"/>
+                  <a:pt x="17259300" y="0"/>
                 </a:lnTo>
                 <a:lnTo>
-                  <a:pt x="14913977" y="7252124"/>
+                  <a:pt x="17259300" y="8414931"/>
                 </a:lnTo>
                 <a:lnTo>
-                  <a:pt x="0" y="7252124"/>
+                  <a:pt x="0" y="8414931"/>
                 </a:lnTo>
                 <a:lnTo>
                   <a:pt x="0" y="0"/>
@@ -10894,7 +10894,7 @@
           <a:blipFill>
             <a:blip r:embed="rId3"/>
             <a:stretch>
-              <a:fillRect l="0" t="-793" r="0" b="-793"/>
+              <a:fillRect l="-658" t="0" r="-1768" b="-3775"/>
             </a:stretch>
           </a:blipFill>
         </p:spPr>

</xml_diff>

<commit_message>
Ajout présentation Bottleneck et mise à jour notebook
</commit_message>
<xml_diff>
--- a/Huang_Nicolas_2_Presentation_Bottleneck_102025.pptx
+++ b/Huang_Nicolas_2_Presentation_Bottleneck_102025.pptx
@@ -5,7 +5,7 @@
     <p:sldMasterId id="2147483648" r:id="rId1"/>
   </p:sldMasterIdLst>
   <p:notesMasterIdLst>
-    <p:notesMasterId r:id="rId17"/>
+    <p:notesMasterId r:id="rId19"/>
   </p:notesMasterIdLst>
   <p:sldIdLst>
     <p:sldId id="256" r:id="rId6"/>
@@ -19,21 +19,23 @@
     <p:sldId id="264" r:id="rId14"/>
     <p:sldId id="265" r:id="rId15"/>
     <p:sldId id="266" r:id="rId16"/>
+    <p:sldId id="267" r:id="rId17"/>
+    <p:sldId id="268" r:id="rId18"/>
   </p:sldIdLst>
   <p:sldSz cx="18288000" cy="10287000"/>
   <p:notesSz cx="6858000" cy="9144000"/>
   <p:embeddedFontLst>
     <p:embeddedFont>
       <p:font typeface="Montserrat" charset="1" panose="00000500000000000000"/>
-      <p:regular r:id="rId20"/>
+      <p:regular r:id="rId22"/>
     </p:embeddedFont>
     <p:embeddedFont>
       <p:font typeface="Montserrat Bold Italics" charset="1" panose="00000800000000000000"/>
-      <p:regular r:id="rId22"/>
+      <p:regular r:id="rId24"/>
     </p:embeddedFont>
     <p:embeddedFont>
       <p:font typeface="Montserrat Italics" charset="1" panose="00000500000000000000"/>
-      <p:regular r:id="rId23"/>
+      <p:regular r:id="rId25"/>
     </p:embeddedFont>
   </p:embeddedFontLst>
   <p:defaultTextStyle>
@@ -911,6 +913,432 @@
 </file>
 
 <file path=ppt/notesSlides/notesSlide11.xml><?xml version="1.0" encoding="utf-8"?>
+<p:notes xmlns:p="http://schemas.openxmlformats.org/presentationml/2006/main" xmlns:a="http://schemas.openxmlformats.org/drawingml/2006/main">
+  <p:cSld>
+    <p:spTree xmlns:r="http://schemas.openxmlformats.org/officeDocument/2006/relationships">
+      <p:nvGrpSpPr>
+        <p:cNvPr id="1" name=""/>
+        <p:cNvGrpSpPr/>
+        <p:nvPr/>
+      </p:nvGrpSpPr>
+      <p:grpSpPr>
+        <a:xfrm>
+          <a:off x="0" y="0"/>
+          <a:ext cx="0" cy="0"/>
+          <a:chOff x="0" y="0"/>
+          <a:chExt cx="0" cy="0"/>
+        </a:xfrm>
+      </p:grpSpPr>
+      <p:sp>
+        <p:nvSpPr>
+          <p:cNvPr id="2" name="Header Placeholder 1"/>
+          <p:cNvSpPr>
+            <a:spLocks noGrp="1"/>
+          </p:cNvSpPr>
+          <p:nvPr>
+            <p:ph type="hdr" sz="quarter"/>
+          </p:nvPr>
+        </p:nvSpPr>
+        <p:spPr>
+          <a:xfrm>
+            <a:off x="0" y="0"/>
+            <a:ext cx="3962400" cy="342900"/>
+          </a:xfrm>
+          <a:prstGeom prst="rect">
+            <a:avLst/>
+          </a:prstGeom>
+        </p:spPr>
+        <p:txBody>
+          <a:bodyPr vert="horz" lIns="91440" tIns="45720" rIns="91440" bIns="45720" rtlCol="0"/>
+          <a:lstStyle>
+            <a:lvl1pPr algn="l">
+              <a:defRPr sz="1200"/>
+            </a:lvl1pPr>
+          </a:lstStyle>
+          <a:p/>
+        </p:txBody>
+      </p:sp>
+      <p:sp>
+        <p:nvSpPr>
+          <p:cNvPr id="3" name="Date Placeholder 2"/>
+          <p:cNvSpPr>
+            <a:spLocks noGrp="1"/>
+          </p:cNvSpPr>
+          <p:nvPr>
+            <p:ph type="dt" idx="1"/>
+          </p:nvPr>
+        </p:nvSpPr>
+        <p:spPr>
+          <a:xfrm>
+            <a:off x="5180013" y="0"/>
+            <a:ext cx="3962400" cy="342900"/>
+          </a:xfrm>
+          <a:prstGeom prst="rect">
+            <a:avLst/>
+          </a:prstGeom>
+        </p:spPr>
+        <p:txBody>
+          <a:bodyPr vert="horz" lIns="91440" tIns="45720" rIns="91440" bIns="45720" rtlCol="0"/>
+          <a:lstStyle>
+            <a:lvl1pPr algn="r">
+              <a:defRPr sz="1200"/>
+            </a:lvl1pPr>
+          </a:lstStyle>
+          <a:p>
+            <a:r id="{B7268E1E-0E44-426D-905E-8AD9B19D2182}" type="datetimeFigureOut">
+              <a:rPr lang="cs-CZ" smtClean="0"/>
+              <a:t>1.7.2013</a:t>
+            </a:r>
+          </a:p>
+        </p:txBody>
+      </p:sp>
+      <p:sp>
+        <p:nvSpPr>
+          <p:cNvPr id="4" name="Slide Image Placeholder 3"/>
+          <p:cNvSpPr>
+            <a:spLocks noGrp="1" noRot="1" noChangeAspect="1"/>
+          </p:cNvSpPr>
+          <p:nvPr>
+            <p:ph type="sldImg" idx="2"/>
+          </p:nvPr>
+        </p:nvSpPr>
+        <p:spPr>
+          <a:xfrm>
+            <a:off x="2857500" y="512763"/>
+            <a:ext cx="3429000" cy="2566987"/>
+          </a:xfrm>
+          <a:prstGeom prst="rect">
+            <a:avLst/>
+          </a:prstGeom>
+          <a:noFill/>
+          <a:ln w="12700">
+            <a:solidFill>
+              <a:prstClr val="black"/>
+            </a:solidFill>
+          </a:ln>
+        </p:spPr>
+        <p:txBody>
+          <a:bodyPr vert="horz" lIns="91440" tIns="45720" rIns="91440" bIns="45720" rtlCol="0" anchor="ctr"/>
+          <a:lstStyle/>
+          <a:p/>
+        </p:txBody>
+      </p:sp>
+      <p:sp>
+        <p:nvSpPr>
+          <p:cNvPr id="5" name="Notes Placeholder 4"/>
+          <p:cNvSpPr>
+            <a:spLocks noGrp="1"/>
+          </p:cNvSpPr>
+          <p:nvPr>
+            <p:ph type="body" sz="quarter" idx="3"/>
+          </p:nvPr>
+        </p:nvSpPr>
+        <p:spPr>
+          <a:xfrm>
+            <a:off x="914400" y="3251200"/>
+            <a:ext cx="7315200" cy="3081338"/>
+          </a:xfrm>
+          <a:prstGeom prst="rect">
+            <a:avLst/>
+          </a:prstGeom>
+        </p:spPr>
+        <p:txBody>
+          <a:bodyPr vert="horz" lIns="91440" tIns="45720" rIns="91440" bIns="45720" rtlCol="0"/>
+          <a:lstStyle/>
+          <a:p>
+            <a:r>
+              <a:rPr lang="en-US"/>
+              <a:t/>
+            </a:r>
+            <a:endParaRPr lang="en-US" smtClean="0"/>
+          </a:p>
+        </p:txBody>
+      </p:sp>
+      <p:sp>
+        <p:nvSpPr>
+          <p:cNvPr id="6" name="Footer Placeholder 5"/>
+          <p:cNvSpPr>
+            <a:spLocks noGrp="1"/>
+          </p:cNvSpPr>
+          <p:nvPr>
+            <p:ph type="ftr" sz="quarter" idx="4"/>
+          </p:nvPr>
+        </p:nvSpPr>
+        <p:spPr>
+          <a:xfrm>
+            <a:off x="0" y="6502400"/>
+            <a:ext cx="3962400" cy="341313"/>
+          </a:xfrm>
+          <a:prstGeom prst="rect">
+            <a:avLst/>
+          </a:prstGeom>
+        </p:spPr>
+        <p:txBody>
+          <a:bodyPr vert="horz" lIns="91440" tIns="45720" rIns="91440" bIns="45720" rtlCol="0" anchor="b"/>
+          <a:lstStyle>
+            <a:lvl1pPr algn="l">
+              <a:defRPr sz="1200"/>
+            </a:lvl1pPr>
+          </a:lstStyle>
+          <a:p/>
+        </p:txBody>
+      </p:sp>
+      <p:sp>
+        <p:nvSpPr>
+          <p:cNvPr id="7" name="Slide Number Placeholder 6"/>
+          <p:cNvSpPr>
+            <a:spLocks noGrp="1"/>
+          </p:cNvSpPr>
+          <p:nvPr>
+            <p:ph type="sldNum" sz="quarter" idx="5"/>
+          </p:nvPr>
+        </p:nvSpPr>
+        <p:spPr>
+          <a:xfrm>
+            <a:off x="5180013" y="6502400"/>
+            <a:ext cx="3962400" cy="341313"/>
+          </a:xfrm>
+          <a:prstGeom prst="rect">
+            <a:avLst/>
+          </a:prstGeom>
+        </p:spPr>
+        <p:txBody>
+          <a:bodyPr vert="horz" lIns="91440" tIns="45720" rIns="91440" bIns="45720" rtlCol="0" anchor="b"/>
+          <a:lstStyle>
+            <a:lvl1pPr algn="r">
+              <a:defRPr sz="1200"/>
+            </a:lvl1pPr>
+          </a:lstStyle>
+          <a:p>
+            <a:r id="{871B2431-D351-4C6E-A3CF-9DFAC0E3E050}" type="slidenum">
+              <a:rPr lang="cs-CZ" smtClean="0"/>
+              <a:t>‹#›</a:t>
+            </a:r>
+          </a:p>
+        </p:txBody>
+      </p:sp>
+    </p:spTree>
+  </p:cSld>
+  <p:clrMapOvr>
+    <a:masterClrMapping/>
+  </p:clrMapOvr>
+</p:notes>
+</file>
+
+<file path=ppt/notesSlides/notesSlide12.xml><?xml version="1.0" encoding="utf-8"?>
+<p:notes xmlns:p="http://schemas.openxmlformats.org/presentationml/2006/main" xmlns:a="http://schemas.openxmlformats.org/drawingml/2006/main">
+  <p:cSld>
+    <p:spTree xmlns:r="http://schemas.openxmlformats.org/officeDocument/2006/relationships">
+      <p:nvGrpSpPr>
+        <p:cNvPr id="1" name=""/>
+        <p:cNvGrpSpPr/>
+        <p:nvPr/>
+      </p:nvGrpSpPr>
+      <p:grpSpPr>
+        <a:xfrm>
+          <a:off x="0" y="0"/>
+          <a:ext cx="0" cy="0"/>
+          <a:chOff x="0" y="0"/>
+          <a:chExt cx="0" cy="0"/>
+        </a:xfrm>
+      </p:grpSpPr>
+      <p:sp>
+        <p:nvSpPr>
+          <p:cNvPr id="2" name="Header Placeholder 1"/>
+          <p:cNvSpPr>
+            <a:spLocks noGrp="1"/>
+          </p:cNvSpPr>
+          <p:nvPr>
+            <p:ph type="hdr" sz="quarter"/>
+          </p:nvPr>
+        </p:nvSpPr>
+        <p:spPr>
+          <a:xfrm>
+            <a:off x="0" y="0"/>
+            <a:ext cx="3962400" cy="342900"/>
+          </a:xfrm>
+          <a:prstGeom prst="rect">
+            <a:avLst/>
+          </a:prstGeom>
+        </p:spPr>
+        <p:txBody>
+          <a:bodyPr vert="horz" lIns="91440" tIns="45720" rIns="91440" bIns="45720" rtlCol="0"/>
+          <a:lstStyle>
+            <a:lvl1pPr algn="l">
+              <a:defRPr sz="1200"/>
+            </a:lvl1pPr>
+          </a:lstStyle>
+          <a:p/>
+        </p:txBody>
+      </p:sp>
+      <p:sp>
+        <p:nvSpPr>
+          <p:cNvPr id="3" name="Date Placeholder 2"/>
+          <p:cNvSpPr>
+            <a:spLocks noGrp="1"/>
+          </p:cNvSpPr>
+          <p:nvPr>
+            <p:ph type="dt" idx="1"/>
+          </p:nvPr>
+        </p:nvSpPr>
+        <p:spPr>
+          <a:xfrm>
+            <a:off x="5180013" y="0"/>
+            <a:ext cx="3962400" cy="342900"/>
+          </a:xfrm>
+          <a:prstGeom prst="rect">
+            <a:avLst/>
+          </a:prstGeom>
+        </p:spPr>
+        <p:txBody>
+          <a:bodyPr vert="horz" lIns="91440" tIns="45720" rIns="91440" bIns="45720" rtlCol="0"/>
+          <a:lstStyle>
+            <a:lvl1pPr algn="r">
+              <a:defRPr sz="1200"/>
+            </a:lvl1pPr>
+          </a:lstStyle>
+          <a:p>
+            <a:r id="{B7268E1E-0E44-426D-905E-8AD9B19D2182}" type="datetimeFigureOut">
+              <a:rPr lang="cs-CZ" smtClean="0"/>
+              <a:t>1.7.2013</a:t>
+            </a:r>
+          </a:p>
+        </p:txBody>
+      </p:sp>
+      <p:sp>
+        <p:nvSpPr>
+          <p:cNvPr id="4" name="Slide Image Placeholder 3"/>
+          <p:cNvSpPr>
+            <a:spLocks noGrp="1" noRot="1" noChangeAspect="1"/>
+          </p:cNvSpPr>
+          <p:nvPr>
+            <p:ph type="sldImg" idx="2"/>
+          </p:nvPr>
+        </p:nvSpPr>
+        <p:spPr>
+          <a:xfrm>
+            <a:off x="2857500" y="512763"/>
+            <a:ext cx="3429000" cy="2566987"/>
+          </a:xfrm>
+          <a:prstGeom prst="rect">
+            <a:avLst/>
+          </a:prstGeom>
+          <a:noFill/>
+          <a:ln w="12700">
+            <a:solidFill>
+              <a:prstClr val="black"/>
+            </a:solidFill>
+          </a:ln>
+        </p:spPr>
+        <p:txBody>
+          <a:bodyPr vert="horz" lIns="91440" tIns="45720" rIns="91440" bIns="45720" rtlCol="0" anchor="ctr"/>
+          <a:lstStyle/>
+          <a:p/>
+        </p:txBody>
+      </p:sp>
+      <p:sp>
+        <p:nvSpPr>
+          <p:cNvPr id="5" name="Notes Placeholder 4"/>
+          <p:cNvSpPr>
+            <a:spLocks noGrp="1"/>
+          </p:cNvSpPr>
+          <p:nvPr>
+            <p:ph type="body" sz="quarter" idx="3"/>
+          </p:nvPr>
+        </p:nvSpPr>
+        <p:spPr>
+          <a:xfrm>
+            <a:off x="914400" y="3251200"/>
+            <a:ext cx="7315200" cy="3081338"/>
+          </a:xfrm>
+          <a:prstGeom prst="rect">
+            <a:avLst/>
+          </a:prstGeom>
+        </p:spPr>
+        <p:txBody>
+          <a:bodyPr vert="horz" lIns="91440" tIns="45720" rIns="91440" bIns="45720" rtlCol="0"/>
+          <a:lstStyle/>
+          <a:p>
+            <a:r>
+              <a:rPr lang="en-US"/>
+              <a:t/>
+            </a:r>
+            <a:endParaRPr lang="en-US" smtClean="0"/>
+          </a:p>
+        </p:txBody>
+      </p:sp>
+      <p:sp>
+        <p:nvSpPr>
+          <p:cNvPr id="6" name="Footer Placeholder 5"/>
+          <p:cNvSpPr>
+            <a:spLocks noGrp="1"/>
+          </p:cNvSpPr>
+          <p:nvPr>
+            <p:ph type="ftr" sz="quarter" idx="4"/>
+          </p:nvPr>
+        </p:nvSpPr>
+        <p:spPr>
+          <a:xfrm>
+            <a:off x="0" y="6502400"/>
+            <a:ext cx="3962400" cy="341313"/>
+          </a:xfrm>
+          <a:prstGeom prst="rect">
+            <a:avLst/>
+          </a:prstGeom>
+        </p:spPr>
+        <p:txBody>
+          <a:bodyPr vert="horz" lIns="91440" tIns="45720" rIns="91440" bIns="45720" rtlCol="0" anchor="b"/>
+          <a:lstStyle>
+            <a:lvl1pPr algn="l">
+              <a:defRPr sz="1200"/>
+            </a:lvl1pPr>
+          </a:lstStyle>
+          <a:p/>
+        </p:txBody>
+      </p:sp>
+      <p:sp>
+        <p:nvSpPr>
+          <p:cNvPr id="7" name="Slide Number Placeholder 6"/>
+          <p:cNvSpPr>
+            <a:spLocks noGrp="1"/>
+          </p:cNvSpPr>
+          <p:nvPr>
+            <p:ph type="sldNum" sz="quarter" idx="5"/>
+          </p:nvPr>
+        </p:nvSpPr>
+        <p:spPr>
+          <a:xfrm>
+            <a:off x="5180013" y="6502400"/>
+            <a:ext cx="3962400" cy="341313"/>
+          </a:xfrm>
+          <a:prstGeom prst="rect">
+            <a:avLst/>
+          </a:prstGeom>
+        </p:spPr>
+        <p:txBody>
+          <a:bodyPr vert="horz" lIns="91440" tIns="45720" rIns="91440" bIns="45720" rtlCol="0" anchor="b"/>
+          <a:lstStyle>
+            <a:lvl1pPr algn="r">
+              <a:defRPr sz="1200"/>
+            </a:lvl1pPr>
+          </a:lstStyle>
+          <a:p>
+            <a:r id="{871B2431-D351-4C6E-A3CF-9DFAC0E3E050}" type="slidenum">
+              <a:rPr lang="cs-CZ" smtClean="0"/>
+              <a:t>‹#›</a:t>
+            </a:r>
+          </a:p>
+        </p:txBody>
+      </p:sp>
+    </p:spTree>
+  </p:cSld>
+  <p:clrMapOvr>
+    <a:masterClrMapping/>
+  </p:clrMapOvr>
+</p:notes>
+</file>
+
+<file path=ppt/notesSlides/notesSlide13.xml><?xml version="1.0" encoding="utf-8"?>
 <p:notes xmlns:p="http://schemas.openxmlformats.org/presentationml/2006/main" xmlns:a="http://schemas.openxmlformats.org/drawingml/2006/main">
   <p:cSld>
     <p:spTree xmlns:r="http://schemas.openxmlformats.org/officeDocument/2006/relationships">
@@ -6196,7 +6624,7 @@
                 <a:cs typeface="Montserrat"/>
                 <a:sym typeface="Montserrat"/>
               </a:rPr>
-              <a:t>02/10/2025</a:t>
+              <a:t>13/10/2025</a:t>
             </a:r>
           </a:p>
         </p:txBody>
@@ -6210,7 +6638,7 @@
 </file>
 
 <file path=ppt/slides/slide10.xml><?xml version="1.0" encoding="utf-8"?>
-<p:sld xmlns:p="http://schemas.openxmlformats.org/presentationml/2006/main" xmlns:a="http://schemas.openxmlformats.org/drawingml/2006/main">
+<p:sld xmlns:p="http://schemas.openxmlformats.org/presentationml/2006/main" xmlns:a="http://schemas.openxmlformats.org/drawingml/2006/main" xmlns:r="http://schemas.openxmlformats.org/officeDocument/2006/relationships">
   <p:cSld>
     <p:spTree>
       <p:nvGrpSpPr>
@@ -6383,6 +6811,692 @@
           </p:spPr>
         </p:sp>
       </p:grpSp>
+      <p:grpSp>
+        <p:nvGrpSpPr>
+          <p:cNvPr name="Group 5" id="5"/>
+          <p:cNvGrpSpPr/>
+          <p:nvPr/>
+        </p:nvGrpSpPr>
+        <p:grpSpPr>
+          <a:xfrm rot="0">
+            <a:off x="2024350" y="1986700"/>
+            <a:ext cx="905400" cy="100800"/>
+            <a:chOff x="0" y="0"/>
+            <a:chExt cx="1207200" cy="134400"/>
+          </a:xfrm>
+        </p:grpSpPr>
+        <p:sp>
+          <p:nvSpPr>
+            <p:cNvPr name="Freeform 6" id="6"/>
+            <p:cNvSpPr/>
+            <p:nvPr/>
+          </p:nvSpPr>
+          <p:spPr>
+            <a:xfrm flipH="false" flipV="false" rot="0">
+              <a:off x="0" y="0"/>
+              <a:ext cx="1207262" cy="134366"/>
+            </a:xfrm>
+            <a:custGeom>
+              <a:avLst/>
+              <a:gdLst/>
+              <a:ahLst/>
+              <a:cxnLst/>
+              <a:rect r="r" b="b" t="t" l="l"/>
+              <a:pathLst>
+                <a:path h="134366" w="1207262">
+                  <a:moveTo>
+                    <a:pt x="0" y="0"/>
+                  </a:moveTo>
+                  <a:lnTo>
+                    <a:pt x="1207262" y="0"/>
+                  </a:lnTo>
+                  <a:lnTo>
+                    <a:pt x="1207262" y="134366"/>
+                  </a:lnTo>
+                  <a:lnTo>
+                    <a:pt x="0" y="134366"/>
+                  </a:lnTo>
+                  <a:close/>
+                </a:path>
+              </a:pathLst>
+            </a:custGeom>
+            <a:solidFill>
+              <a:srgbClr val="F3F3F3"/>
+            </a:solidFill>
+          </p:spPr>
+        </p:sp>
+      </p:grpSp>
+      <p:sp>
+        <p:nvSpPr>
+          <p:cNvPr name="Freeform 7" id="7"/>
+          <p:cNvSpPr/>
+          <p:nvPr/>
+        </p:nvSpPr>
+        <p:spPr>
+          <a:xfrm flipH="false" flipV="false" rot="0">
+            <a:off x="2238026" y="2789925"/>
+            <a:ext cx="13811948" cy="7388769"/>
+          </a:xfrm>
+          <a:custGeom>
+            <a:avLst/>
+            <a:gdLst/>
+            <a:ahLst/>
+            <a:cxnLst/>
+            <a:rect r="r" b="b" t="t" l="l"/>
+            <a:pathLst>
+              <a:path h="7388769" w="13811948">
+                <a:moveTo>
+                  <a:pt x="0" y="0"/>
+                </a:moveTo>
+                <a:lnTo>
+                  <a:pt x="13811948" y="0"/>
+                </a:lnTo>
+                <a:lnTo>
+                  <a:pt x="13811948" y="7388769"/>
+                </a:lnTo>
+                <a:lnTo>
+                  <a:pt x="0" y="7388769"/>
+                </a:lnTo>
+                <a:lnTo>
+                  <a:pt x="0" y="0"/>
+                </a:lnTo>
+                <a:close/>
+              </a:path>
+            </a:pathLst>
+          </a:custGeom>
+          <a:blipFill>
+            <a:blip r:embed="rId3"/>
+            <a:stretch>
+              <a:fillRect l="0" t="-1406" r="0" b="-1406"/>
+            </a:stretch>
+          </a:blipFill>
+        </p:spPr>
+      </p:sp>
+      <p:sp>
+        <p:nvSpPr>
+          <p:cNvPr name="TextBox 8" id="8"/>
+          <p:cNvSpPr txBox="true"/>
+          <p:nvPr/>
+        </p:nvSpPr>
+        <p:spPr>
+          <a:xfrm rot="0">
+            <a:off x="1882475" y="823075"/>
+            <a:ext cx="16858350" cy="693420"/>
+          </a:xfrm>
+          <a:prstGeom prst="rect">
+            <a:avLst/>
+          </a:prstGeom>
+        </p:spPr>
+        <p:txBody>
+          <a:bodyPr anchor="t" rtlCol="false" tIns="0" lIns="0" bIns="0" rIns="0">
+            <a:spAutoFit/>
+          </a:bodyPr>
+          <a:lstStyle/>
+          <a:p>
+            <a:pPr algn="l">
+              <a:lnSpc>
+                <a:spcPts val="2640"/>
+              </a:lnSpc>
+            </a:pPr>
+            <a:r>
+              <a:rPr lang="en-US" sz="2750">
+                <a:solidFill>
+                  <a:srgbClr val="F3F3F3"/>
+                </a:solidFill>
+                <a:latin typeface="Montserrat"/>
+                <a:ea typeface="Montserrat"/>
+                <a:cs typeface="Montserrat"/>
+                <a:sym typeface="Montserrat"/>
+              </a:rPr>
+              <a:t>Analyses complémentaires</a:t>
+            </a:r>
+          </a:p>
+          <a:p>
+            <a:pPr algn="l">
+              <a:lnSpc>
+                <a:spcPts val="2640"/>
+              </a:lnSpc>
+            </a:pPr>
+            <a:r>
+              <a:rPr lang="en-US" sz="2750">
+                <a:solidFill>
+                  <a:srgbClr val="F3F3F3"/>
+                </a:solidFill>
+                <a:latin typeface="Montserrat"/>
+                <a:ea typeface="Montserrat"/>
+                <a:cs typeface="Montserrat"/>
+                <a:sym typeface="Montserrat"/>
+              </a:rPr>
+              <a:t>CA, quantités, stocks, taux de marge et correlations</a:t>
+            </a:r>
+          </a:p>
+        </p:txBody>
+      </p:sp>
+    </p:spTree>
+  </p:cSld>
+  <p:clrMapOvr>
+    <a:masterClrMapping/>
+  </p:clrMapOvr>
+</p:sld>
+</file>
+
+<file path=ppt/slides/slide11.xml><?xml version="1.0" encoding="utf-8"?>
+<p:sld xmlns:p="http://schemas.openxmlformats.org/presentationml/2006/main" xmlns:a="http://schemas.openxmlformats.org/drawingml/2006/main" xmlns:r="http://schemas.openxmlformats.org/officeDocument/2006/relationships">
+  <p:cSld>
+    <p:spTree>
+      <p:nvGrpSpPr>
+        <p:cNvPr id="1" name=""/>
+        <p:cNvGrpSpPr/>
+        <p:nvPr/>
+      </p:nvGrpSpPr>
+      <p:grpSpPr>
+        <a:xfrm>
+          <a:off x="0" y="0"/>
+          <a:ext cx="0" cy="0"/>
+          <a:chOff x="0" y="0"/>
+          <a:chExt cx="0" cy="0"/>
+        </a:xfrm>
+      </p:grpSpPr>
+      <p:grpSp>
+        <p:nvGrpSpPr>
+          <p:cNvPr name="Group 2" id="2"/>
+          <p:cNvGrpSpPr/>
+          <p:nvPr/>
+        </p:nvGrpSpPr>
+        <p:grpSpPr>
+          <a:xfrm rot="0">
+            <a:off x="-9525" y="-9525"/>
+            <a:ext cx="18307050" cy="2799450"/>
+            <a:chOff x="0" y="0"/>
+            <a:chExt cx="24409400" cy="3732600"/>
+          </a:xfrm>
+        </p:grpSpPr>
+        <p:sp>
+          <p:nvSpPr>
+            <p:cNvPr name="Freeform 3" id="3"/>
+            <p:cNvSpPr/>
+            <p:nvPr/>
+          </p:nvSpPr>
+          <p:spPr>
+            <a:xfrm flipH="false" flipV="false" rot="0">
+              <a:off x="12700" y="12700"/>
+              <a:ext cx="24384000" cy="3707257"/>
+            </a:xfrm>
+            <a:custGeom>
+              <a:avLst/>
+              <a:gdLst/>
+              <a:ahLst/>
+              <a:cxnLst/>
+              <a:rect r="r" b="b" t="t" l="l"/>
+              <a:pathLst>
+                <a:path h="3707257" w="24384000">
+                  <a:moveTo>
+                    <a:pt x="0" y="0"/>
+                  </a:moveTo>
+                  <a:lnTo>
+                    <a:pt x="24384000" y="0"/>
+                  </a:lnTo>
+                  <a:lnTo>
+                    <a:pt x="24384000" y="3707257"/>
+                  </a:lnTo>
+                  <a:lnTo>
+                    <a:pt x="0" y="3707257"/>
+                  </a:lnTo>
+                  <a:close/>
+                </a:path>
+              </a:pathLst>
+            </a:custGeom>
+            <a:solidFill>
+              <a:srgbClr val="004D40"/>
+            </a:solidFill>
+          </p:spPr>
+        </p:sp>
+        <p:sp>
+          <p:nvSpPr>
+            <p:cNvPr name="Freeform 4" id="4"/>
+            <p:cNvSpPr/>
+            <p:nvPr/>
+          </p:nvSpPr>
+          <p:spPr>
+            <a:xfrm flipH="false" flipV="false" rot="0">
+              <a:off x="0" y="0"/>
+              <a:ext cx="24409400" cy="3732657"/>
+            </a:xfrm>
+            <a:custGeom>
+              <a:avLst/>
+              <a:gdLst/>
+              <a:ahLst/>
+              <a:cxnLst/>
+              <a:rect r="r" b="b" t="t" l="l"/>
+              <a:pathLst>
+                <a:path h="3732657" w="24409400">
+                  <a:moveTo>
+                    <a:pt x="12700" y="0"/>
+                  </a:moveTo>
+                  <a:lnTo>
+                    <a:pt x="24396700" y="0"/>
+                  </a:lnTo>
+                  <a:cubicBezTo>
+                    <a:pt x="24403686" y="0"/>
+                    <a:pt x="24409400" y="5715"/>
+                    <a:pt x="24409400" y="12700"/>
+                  </a:cubicBezTo>
+                  <a:lnTo>
+                    <a:pt x="24409400" y="3719957"/>
+                  </a:lnTo>
+                  <a:cubicBezTo>
+                    <a:pt x="24409400" y="3726942"/>
+                    <a:pt x="24403686" y="3732657"/>
+                    <a:pt x="24396700" y="3732657"/>
+                  </a:cubicBezTo>
+                  <a:lnTo>
+                    <a:pt x="12700" y="3732657"/>
+                  </a:lnTo>
+                  <a:cubicBezTo>
+                    <a:pt x="5715" y="3732657"/>
+                    <a:pt x="0" y="3726942"/>
+                    <a:pt x="0" y="3719957"/>
+                  </a:cubicBezTo>
+                  <a:lnTo>
+                    <a:pt x="0" y="12700"/>
+                  </a:lnTo>
+                  <a:cubicBezTo>
+                    <a:pt x="0" y="5715"/>
+                    <a:pt x="5715" y="0"/>
+                    <a:pt x="12700" y="0"/>
+                  </a:cubicBezTo>
+                  <a:moveTo>
+                    <a:pt x="12700" y="25400"/>
+                  </a:moveTo>
+                  <a:lnTo>
+                    <a:pt x="12700" y="12700"/>
+                  </a:lnTo>
+                  <a:lnTo>
+                    <a:pt x="25400" y="12700"/>
+                  </a:lnTo>
+                  <a:lnTo>
+                    <a:pt x="25400" y="3719957"/>
+                  </a:lnTo>
+                  <a:lnTo>
+                    <a:pt x="12700" y="3719957"/>
+                  </a:lnTo>
+                  <a:lnTo>
+                    <a:pt x="12700" y="3707257"/>
+                  </a:lnTo>
+                  <a:lnTo>
+                    <a:pt x="24396700" y="3707257"/>
+                  </a:lnTo>
+                  <a:lnTo>
+                    <a:pt x="24396700" y="3719957"/>
+                  </a:lnTo>
+                  <a:lnTo>
+                    <a:pt x="24384000" y="3719957"/>
+                  </a:lnTo>
+                  <a:lnTo>
+                    <a:pt x="24384000" y="12700"/>
+                  </a:lnTo>
+                  <a:lnTo>
+                    <a:pt x="24396700" y="12700"/>
+                  </a:lnTo>
+                  <a:lnTo>
+                    <a:pt x="24396700" y="25400"/>
+                  </a:lnTo>
+                  <a:lnTo>
+                    <a:pt x="12700" y="25400"/>
+                  </a:lnTo>
+                  <a:close/>
+                </a:path>
+              </a:pathLst>
+            </a:custGeom>
+            <a:solidFill>
+              <a:srgbClr val="FFFFFF"/>
+            </a:solidFill>
+          </p:spPr>
+        </p:sp>
+      </p:grpSp>
+      <p:grpSp>
+        <p:nvGrpSpPr>
+          <p:cNvPr name="Group 5" id="5"/>
+          <p:cNvGrpSpPr/>
+          <p:nvPr/>
+        </p:nvGrpSpPr>
+        <p:grpSpPr>
+          <a:xfrm rot="0">
+            <a:off x="2024350" y="1986700"/>
+            <a:ext cx="905400" cy="100800"/>
+            <a:chOff x="0" y="0"/>
+            <a:chExt cx="1207200" cy="134400"/>
+          </a:xfrm>
+        </p:grpSpPr>
+        <p:sp>
+          <p:nvSpPr>
+            <p:cNvPr name="Freeform 6" id="6"/>
+            <p:cNvSpPr/>
+            <p:nvPr/>
+          </p:nvSpPr>
+          <p:spPr>
+            <a:xfrm flipH="false" flipV="false" rot="0">
+              <a:off x="0" y="0"/>
+              <a:ext cx="1207262" cy="134366"/>
+            </a:xfrm>
+            <a:custGeom>
+              <a:avLst/>
+              <a:gdLst/>
+              <a:ahLst/>
+              <a:cxnLst/>
+              <a:rect r="r" b="b" t="t" l="l"/>
+              <a:pathLst>
+                <a:path h="134366" w="1207262">
+                  <a:moveTo>
+                    <a:pt x="0" y="0"/>
+                  </a:moveTo>
+                  <a:lnTo>
+                    <a:pt x="1207262" y="0"/>
+                  </a:lnTo>
+                  <a:lnTo>
+                    <a:pt x="1207262" y="134366"/>
+                  </a:lnTo>
+                  <a:lnTo>
+                    <a:pt x="0" y="134366"/>
+                  </a:lnTo>
+                  <a:close/>
+                </a:path>
+              </a:pathLst>
+            </a:custGeom>
+            <a:solidFill>
+              <a:srgbClr val="F3F3F3"/>
+            </a:solidFill>
+          </p:spPr>
+        </p:sp>
+      </p:grpSp>
+      <p:sp>
+        <p:nvSpPr>
+          <p:cNvPr name="Freeform 7" id="7"/>
+          <p:cNvSpPr/>
+          <p:nvPr/>
+        </p:nvSpPr>
+        <p:spPr>
+          <a:xfrm flipH="false" flipV="false" rot="0">
+            <a:off x="2289811" y="2798799"/>
+            <a:ext cx="13708378" cy="7488201"/>
+          </a:xfrm>
+          <a:custGeom>
+            <a:avLst/>
+            <a:gdLst/>
+            <a:ahLst/>
+            <a:cxnLst/>
+            <a:rect r="r" b="b" t="t" l="l"/>
+            <a:pathLst>
+              <a:path h="7488201" w="13708378">
+                <a:moveTo>
+                  <a:pt x="0" y="0"/>
+                </a:moveTo>
+                <a:lnTo>
+                  <a:pt x="13708378" y="0"/>
+                </a:lnTo>
+                <a:lnTo>
+                  <a:pt x="13708378" y="7488201"/>
+                </a:lnTo>
+                <a:lnTo>
+                  <a:pt x="0" y="7488201"/>
+                </a:lnTo>
+                <a:lnTo>
+                  <a:pt x="0" y="0"/>
+                </a:lnTo>
+                <a:close/>
+              </a:path>
+            </a:pathLst>
+          </a:custGeom>
+          <a:blipFill>
+            <a:blip r:embed="rId3"/>
+            <a:stretch>
+              <a:fillRect l="0" t="0" r="0" b="0"/>
+            </a:stretch>
+          </a:blipFill>
+        </p:spPr>
+      </p:sp>
+      <p:sp>
+        <p:nvSpPr>
+          <p:cNvPr name="TextBox 8" id="8"/>
+          <p:cNvSpPr txBox="true"/>
+          <p:nvPr/>
+        </p:nvSpPr>
+        <p:spPr>
+          <a:xfrm rot="0">
+            <a:off x="1882475" y="823075"/>
+            <a:ext cx="16858350" cy="693420"/>
+          </a:xfrm>
+          <a:prstGeom prst="rect">
+            <a:avLst/>
+          </a:prstGeom>
+        </p:spPr>
+        <p:txBody>
+          <a:bodyPr anchor="t" rtlCol="false" tIns="0" lIns="0" bIns="0" rIns="0">
+            <a:spAutoFit/>
+          </a:bodyPr>
+          <a:lstStyle/>
+          <a:p>
+            <a:pPr algn="l">
+              <a:lnSpc>
+                <a:spcPts val="2640"/>
+              </a:lnSpc>
+            </a:pPr>
+            <a:r>
+              <a:rPr lang="en-US" sz="2750">
+                <a:solidFill>
+                  <a:srgbClr val="F3F3F3"/>
+                </a:solidFill>
+                <a:latin typeface="Montserrat"/>
+                <a:ea typeface="Montserrat"/>
+                <a:cs typeface="Montserrat"/>
+                <a:sym typeface="Montserrat"/>
+              </a:rPr>
+              <a:t>Analyses complémentaires</a:t>
+            </a:r>
+          </a:p>
+          <a:p>
+            <a:pPr algn="l">
+              <a:lnSpc>
+                <a:spcPts val="2640"/>
+              </a:lnSpc>
+            </a:pPr>
+            <a:r>
+              <a:rPr lang="en-US" sz="2750">
+                <a:solidFill>
+                  <a:srgbClr val="F3F3F3"/>
+                </a:solidFill>
+                <a:latin typeface="Montserrat"/>
+                <a:ea typeface="Montserrat"/>
+                <a:cs typeface="Montserrat"/>
+                <a:sym typeface="Montserrat"/>
+              </a:rPr>
+              <a:t>CA, quantités, stocks, taux de marge et correlations</a:t>
+            </a:r>
+          </a:p>
+        </p:txBody>
+      </p:sp>
+    </p:spTree>
+  </p:cSld>
+  <p:clrMapOvr>
+    <a:masterClrMapping/>
+  </p:clrMapOvr>
+</p:sld>
+</file>
+
+<file path=ppt/slides/slide12.xml><?xml version="1.0" encoding="utf-8"?>
+<p:sld xmlns:p="http://schemas.openxmlformats.org/presentationml/2006/main" xmlns:a="http://schemas.openxmlformats.org/drawingml/2006/main">
+  <p:cSld>
+    <p:spTree>
+      <p:nvGrpSpPr>
+        <p:cNvPr id="1" name=""/>
+        <p:cNvGrpSpPr/>
+        <p:nvPr/>
+      </p:nvGrpSpPr>
+      <p:grpSpPr>
+        <a:xfrm>
+          <a:off x="0" y="0"/>
+          <a:ext cx="0" cy="0"/>
+          <a:chOff x="0" y="0"/>
+          <a:chExt cx="0" cy="0"/>
+        </a:xfrm>
+      </p:grpSpPr>
+      <p:grpSp>
+        <p:nvGrpSpPr>
+          <p:cNvPr name="Group 2" id="2"/>
+          <p:cNvGrpSpPr/>
+          <p:nvPr/>
+        </p:nvGrpSpPr>
+        <p:grpSpPr>
+          <a:xfrm rot="0">
+            <a:off x="-9525" y="-9525"/>
+            <a:ext cx="18307050" cy="2799450"/>
+            <a:chOff x="0" y="0"/>
+            <a:chExt cx="24409400" cy="3732600"/>
+          </a:xfrm>
+        </p:grpSpPr>
+        <p:sp>
+          <p:nvSpPr>
+            <p:cNvPr name="Freeform 3" id="3"/>
+            <p:cNvSpPr/>
+            <p:nvPr/>
+          </p:nvSpPr>
+          <p:spPr>
+            <a:xfrm flipH="false" flipV="false" rot="0">
+              <a:off x="12700" y="12700"/>
+              <a:ext cx="24384000" cy="3707257"/>
+            </a:xfrm>
+            <a:custGeom>
+              <a:avLst/>
+              <a:gdLst/>
+              <a:ahLst/>
+              <a:cxnLst/>
+              <a:rect r="r" b="b" t="t" l="l"/>
+              <a:pathLst>
+                <a:path h="3707257" w="24384000">
+                  <a:moveTo>
+                    <a:pt x="0" y="0"/>
+                  </a:moveTo>
+                  <a:lnTo>
+                    <a:pt x="24384000" y="0"/>
+                  </a:lnTo>
+                  <a:lnTo>
+                    <a:pt x="24384000" y="3707257"/>
+                  </a:lnTo>
+                  <a:lnTo>
+                    <a:pt x="0" y="3707257"/>
+                  </a:lnTo>
+                  <a:close/>
+                </a:path>
+              </a:pathLst>
+            </a:custGeom>
+            <a:solidFill>
+              <a:srgbClr val="004D40"/>
+            </a:solidFill>
+          </p:spPr>
+        </p:sp>
+        <p:sp>
+          <p:nvSpPr>
+            <p:cNvPr name="Freeform 4" id="4"/>
+            <p:cNvSpPr/>
+            <p:nvPr/>
+          </p:nvSpPr>
+          <p:spPr>
+            <a:xfrm flipH="false" flipV="false" rot="0">
+              <a:off x="0" y="0"/>
+              <a:ext cx="24409400" cy="3732657"/>
+            </a:xfrm>
+            <a:custGeom>
+              <a:avLst/>
+              <a:gdLst/>
+              <a:ahLst/>
+              <a:cxnLst/>
+              <a:rect r="r" b="b" t="t" l="l"/>
+              <a:pathLst>
+                <a:path h="3732657" w="24409400">
+                  <a:moveTo>
+                    <a:pt x="12700" y="0"/>
+                  </a:moveTo>
+                  <a:lnTo>
+                    <a:pt x="24396700" y="0"/>
+                  </a:lnTo>
+                  <a:cubicBezTo>
+                    <a:pt x="24403686" y="0"/>
+                    <a:pt x="24409400" y="5715"/>
+                    <a:pt x="24409400" y="12700"/>
+                  </a:cubicBezTo>
+                  <a:lnTo>
+                    <a:pt x="24409400" y="3719957"/>
+                  </a:lnTo>
+                  <a:cubicBezTo>
+                    <a:pt x="24409400" y="3726942"/>
+                    <a:pt x="24403686" y="3732657"/>
+                    <a:pt x="24396700" y="3732657"/>
+                  </a:cubicBezTo>
+                  <a:lnTo>
+                    <a:pt x="12700" y="3732657"/>
+                  </a:lnTo>
+                  <a:cubicBezTo>
+                    <a:pt x="5715" y="3732657"/>
+                    <a:pt x="0" y="3726942"/>
+                    <a:pt x="0" y="3719957"/>
+                  </a:cubicBezTo>
+                  <a:lnTo>
+                    <a:pt x="0" y="12700"/>
+                  </a:lnTo>
+                  <a:cubicBezTo>
+                    <a:pt x="0" y="5715"/>
+                    <a:pt x="5715" y="0"/>
+                    <a:pt x="12700" y="0"/>
+                  </a:cubicBezTo>
+                  <a:moveTo>
+                    <a:pt x="12700" y="25400"/>
+                  </a:moveTo>
+                  <a:lnTo>
+                    <a:pt x="12700" y="12700"/>
+                  </a:lnTo>
+                  <a:lnTo>
+                    <a:pt x="25400" y="12700"/>
+                  </a:lnTo>
+                  <a:lnTo>
+                    <a:pt x="25400" y="3719957"/>
+                  </a:lnTo>
+                  <a:lnTo>
+                    <a:pt x="12700" y="3719957"/>
+                  </a:lnTo>
+                  <a:lnTo>
+                    <a:pt x="12700" y="3707257"/>
+                  </a:lnTo>
+                  <a:lnTo>
+                    <a:pt x="24396700" y="3707257"/>
+                  </a:lnTo>
+                  <a:lnTo>
+                    <a:pt x="24396700" y="3719957"/>
+                  </a:lnTo>
+                  <a:lnTo>
+                    <a:pt x="24384000" y="3719957"/>
+                  </a:lnTo>
+                  <a:lnTo>
+                    <a:pt x="24384000" y="12700"/>
+                  </a:lnTo>
+                  <a:lnTo>
+                    <a:pt x="24396700" y="12700"/>
+                  </a:lnTo>
+                  <a:lnTo>
+                    <a:pt x="24396700" y="25400"/>
+                  </a:lnTo>
+                  <a:lnTo>
+                    <a:pt x="12700" y="25400"/>
+                  </a:lnTo>
+                  <a:close/>
+                </a:path>
+              </a:pathLst>
+            </a:custGeom>
+            <a:solidFill>
+              <a:srgbClr val="FFFFFF"/>
+            </a:solidFill>
+          </p:spPr>
+        </p:sp>
+      </p:grpSp>
       <p:sp>
         <p:nvSpPr>
           <p:cNvPr name="TextBox 5" id="5"/>
@@ -6951,7 +8065,7 @@
 </p:sld>
 </file>
 
-<file path=ppt/slides/slide11.xml><?xml version="1.0" encoding="utf-8"?>
+<file path=ppt/slides/slide13.xml><?xml version="1.0" encoding="utf-8"?>
 <p:sld xmlns:p="http://schemas.openxmlformats.org/presentationml/2006/main" xmlns:a="http://schemas.openxmlformats.org/drawingml/2006/main">
   <p:cSld>
     <p:spTree>
@@ -10861,8 +11975,8 @@
         </p:nvSpPr>
         <p:spPr>
           <a:xfrm flipH="false" flipV="false" rot="0">
-            <a:off x="394996" y="1872069"/>
-            <a:ext cx="17259300" cy="8414931"/>
+            <a:off x="245228" y="1872069"/>
+            <a:ext cx="17778494" cy="8414931"/>
           </a:xfrm>
           <a:custGeom>
             <a:avLst/>
@@ -10871,15 +11985,15 @@
             <a:cxnLst/>
             <a:rect r="r" b="b" t="t" l="l"/>
             <a:pathLst>
-              <a:path h="8414931" w="17259300">
+              <a:path h="8414931" w="17778494">
                 <a:moveTo>
                   <a:pt x="0" y="0"/>
                 </a:moveTo>
                 <a:lnTo>
-                  <a:pt x="17259300" y="0"/>
+                  <a:pt x="17778494" y="0"/>
                 </a:lnTo>
                 <a:lnTo>
-                  <a:pt x="17259300" y="8414931"/>
+                  <a:pt x="17778494" y="8414931"/>
                 </a:lnTo>
                 <a:lnTo>
                   <a:pt x="0" y="8414931"/>
@@ -10894,7 +12008,7 @@
           <a:blipFill>
             <a:blip r:embed="rId3"/>
             <a:stretch>
-              <a:fillRect l="-658" t="0" r="-1768" b="-3775"/>
+              <a:fillRect l="0" t="-10095" r="0" b="-1086"/>
             </a:stretch>
           </a:blipFill>
         </p:spPr>
@@ -10992,10 +12106,10 @@
         </p:nvGrpSpPr>
         <p:grpSpPr>
           <a:xfrm rot="0">
-            <a:off x="-9525" y="-9525"/>
-            <a:ext cx="18307050" cy="2799450"/>
+            <a:off x="-19050" y="0"/>
+            <a:ext cx="18307050" cy="1872069"/>
             <a:chOff x="0" y="0"/>
-            <a:chExt cx="24409400" cy="3732600"/>
+            <a:chExt cx="24409400" cy="2496092"/>
           </a:xfrm>
         </p:grpSpPr>
         <p:sp>
@@ -11006,8 +12120,8 @@
           </p:nvSpPr>
           <p:spPr>
             <a:xfrm flipH="false" flipV="false" rot="0">
-              <a:off x="12700" y="12700"/>
-              <a:ext cx="24384000" cy="3707257"/>
+              <a:off x="12700" y="8493"/>
+              <a:ext cx="24384000" cy="2479145"/>
             </a:xfrm>
             <a:custGeom>
               <a:avLst/>
@@ -11016,7 +12130,7 @@
               <a:cxnLst/>
               <a:rect r="r" b="b" t="t" l="l"/>
               <a:pathLst>
-                <a:path h="3707257" w="24384000">
+                <a:path h="2479145" w="24384000">
                   <a:moveTo>
                     <a:pt x="0" y="0"/>
                   </a:moveTo>
@@ -11024,10 +12138,10 @@
                     <a:pt x="24384000" y="0"/>
                   </a:lnTo>
                   <a:lnTo>
-                    <a:pt x="24384000" y="3707257"/>
-                  </a:lnTo>
-                  <a:lnTo>
-                    <a:pt x="0" y="3707257"/>
+                    <a:pt x="24384000" y="2479144"/>
+                  </a:lnTo>
+                  <a:lnTo>
+                    <a:pt x="0" y="2479144"/>
                   </a:lnTo>
                   <a:close/>
                 </a:path>
@@ -11047,7 +12161,7 @@
           <p:spPr>
             <a:xfrm flipH="false" flipV="false" rot="0">
               <a:off x="0" y="0"/>
-              <a:ext cx="24409400" cy="3732657"/>
+              <a:ext cx="24409400" cy="2496149"/>
             </a:xfrm>
             <a:custGeom>
               <a:avLst/>
@@ -11056,7 +12170,7 @@
               <a:cxnLst/>
               <a:rect r="r" b="b" t="t" l="l"/>
               <a:pathLst>
-                <a:path h="3732657" w="24409400">
+                <a:path h="2496149" w="24409400">
                   <a:moveTo>
                     <a:pt x="12700" y="0"/>
                   </a:moveTo>
@@ -11065,71 +12179,71 @@
                   </a:lnTo>
                   <a:cubicBezTo>
                     <a:pt x="24403686" y="0"/>
-                    <a:pt x="24409400" y="5715"/>
-                    <a:pt x="24409400" y="12700"/>
+                    <a:pt x="24409400" y="3822"/>
+                    <a:pt x="24409400" y="8493"/>
                   </a:cubicBezTo>
                   <a:lnTo>
-                    <a:pt x="24409400" y="3719957"/>
+                    <a:pt x="24409400" y="2487637"/>
                   </a:lnTo>
                   <a:cubicBezTo>
-                    <a:pt x="24409400" y="3726942"/>
-                    <a:pt x="24403686" y="3732657"/>
-                    <a:pt x="24396700" y="3732657"/>
+                    <a:pt x="24409400" y="2492308"/>
+                    <a:pt x="24403686" y="2496149"/>
+                    <a:pt x="24396700" y="2496149"/>
                   </a:cubicBezTo>
                   <a:lnTo>
-                    <a:pt x="12700" y="3732657"/>
+                    <a:pt x="12700" y="2496149"/>
                   </a:lnTo>
                   <a:cubicBezTo>
-                    <a:pt x="5715" y="3732657"/>
-                    <a:pt x="0" y="3726942"/>
-                    <a:pt x="0" y="3719957"/>
+                    <a:pt x="5715" y="2496149"/>
+                    <a:pt x="0" y="2492308"/>
+                    <a:pt x="0" y="2487637"/>
                   </a:cubicBezTo>
                   <a:lnTo>
-                    <a:pt x="0" y="12700"/>
+                    <a:pt x="0" y="8493"/>
                   </a:lnTo>
                   <a:cubicBezTo>
-                    <a:pt x="0" y="5715"/>
+                    <a:pt x="0" y="3822"/>
                     <a:pt x="5715" y="0"/>
                     <a:pt x="12700" y="0"/>
                   </a:cubicBezTo>
                   <a:moveTo>
-                    <a:pt x="12700" y="25400"/>
+                    <a:pt x="12700" y="16986"/>
                   </a:moveTo>
                   <a:lnTo>
-                    <a:pt x="12700" y="12700"/>
-                  </a:lnTo>
-                  <a:lnTo>
-                    <a:pt x="25400" y="12700"/>
-                  </a:lnTo>
-                  <a:lnTo>
-                    <a:pt x="25400" y="3719957"/>
-                  </a:lnTo>
-                  <a:lnTo>
-                    <a:pt x="12700" y="3719957"/>
-                  </a:lnTo>
-                  <a:lnTo>
-                    <a:pt x="12700" y="3707257"/>
-                  </a:lnTo>
-                  <a:lnTo>
-                    <a:pt x="24396700" y="3707257"/>
-                  </a:lnTo>
-                  <a:lnTo>
-                    <a:pt x="24396700" y="3719957"/>
-                  </a:lnTo>
-                  <a:lnTo>
-                    <a:pt x="24384000" y="3719957"/>
-                  </a:lnTo>
-                  <a:lnTo>
-                    <a:pt x="24384000" y="12700"/>
-                  </a:lnTo>
-                  <a:lnTo>
-                    <a:pt x="24396700" y="12700"/>
-                  </a:lnTo>
-                  <a:lnTo>
-                    <a:pt x="24396700" y="25400"/>
-                  </a:lnTo>
-                  <a:lnTo>
-                    <a:pt x="12700" y="25400"/>
+                    <a:pt x="12700" y="8493"/>
+                  </a:lnTo>
+                  <a:lnTo>
+                    <a:pt x="25400" y="8493"/>
+                  </a:lnTo>
+                  <a:lnTo>
+                    <a:pt x="25400" y="2487637"/>
+                  </a:lnTo>
+                  <a:lnTo>
+                    <a:pt x="12700" y="2487637"/>
+                  </a:lnTo>
+                  <a:lnTo>
+                    <a:pt x="12700" y="2479145"/>
+                  </a:lnTo>
+                  <a:lnTo>
+                    <a:pt x="24396700" y="2479145"/>
+                  </a:lnTo>
+                  <a:lnTo>
+                    <a:pt x="24396700" y="2487637"/>
+                  </a:lnTo>
+                  <a:lnTo>
+                    <a:pt x="24384000" y="2487637"/>
+                  </a:lnTo>
+                  <a:lnTo>
+                    <a:pt x="24384000" y="8493"/>
+                  </a:lnTo>
+                  <a:lnTo>
+                    <a:pt x="24396700" y="8493"/>
+                  </a:lnTo>
+                  <a:lnTo>
+                    <a:pt x="24396700" y="16986"/>
+                  </a:lnTo>
+                  <a:lnTo>
+                    <a:pt x="12700" y="16986"/>
                   </a:lnTo>
                   <a:close/>
                 </a:path>
@@ -11204,8 +12318,8 @@
         </p:nvSpPr>
         <p:spPr>
           <a:xfrm flipH="false" flipV="false" rot="0">
-            <a:off x="2477050" y="2789925"/>
-            <a:ext cx="13242423" cy="7267184"/>
+            <a:off x="2280286" y="1986700"/>
+            <a:ext cx="14440120" cy="7839782"/>
           </a:xfrm>
           <a:custGeom>
             <a:avLst/>
@@ -11214,18 +12328,18 @@
             <a:cxnLst/>
             <a:rect r="r" b="b" t="t" l="l"/>
             <a:pathLst>
-              <a:path h="7267184" w="13242423">
+              <a:path h="7839782" w="14440120">
                 <a:moveTo>
                   <a:pt x="0" y="0"/>
                 </a:moveTo>
                 <a:lnTo>
-                  <a:pt x="13242423" y="0"/>
+                  <a:pt x="14440120" y="0"/>
                 </a:lnTo>
                 <a:lnTo>
-                  <a:pt x="13242423" y="7267184"/>
+                  <a:pt x="14440120" y="7839782"/>
                 </a:lnTo>
                 <a:lnTo>
-                  <a:pt x="0" y="7267184"/>
+                  <a:pt x="0" y="7839782"/>
                 </a:lnTo>
                 <a:lnTo>
                   <a:pt x="0" y="0"/>
@@ -11336,9 +12450,9 @@
         <p:grpSpPr>
           <a:xfrm rot="0">
             <a:off x="-9525" y="-9525"/>
-            <a:ext cx="18307050" cy="2799450"/>
+            <a:ext cx="18307050" cy="2541844"/>
             <a:chOff x="0" y="0"/>
-            <a:chExt cx="24409400" cy="3732600"/>
+            <a:chExt cx="24409400" cy="3389126"/>
           </a:xfrm>
         </p:grpSpPr>
         <p:sp>
@@ -11349,8 +12463,8 @@
           </p:nvSpPr>
           <p:spPr>
             <a:xfrm flipH="false" flipV="false" rot="0">
-              <a:off x="12700" y="12700"/>
-              <a:ext cx="24384000" cy="3707257"/>
+              <a:off x="12700" y="11531"/>
+              <a:ext cx="24384000" cy="3366115"/>
             </a:xfrm>
             <a:custGeom>
               <a:avLst/>
@@ -11359,7 +12473,7 @@
               <a:cxnLst/>
               <a:rect r="r" b="b" t="t" l="l"/>
               <a:pathLst>
-                <a:path h="3707257" w="24384000">
+                <a:path h="3366115" w="24384000">
                   <a:moveTo>
                     <a:pt x="0" y="0"/>
                   </a:moveTo>
@@ -11367,10 +12481,10 @@
                     <a:pt x="24384000" y="0"/>
                   </a:lnTo>
                   <a:lnTo>
-                    <a:pt x="24384000" y="3707257"/>
-                  </a:lnTo>
-                  <a:lnTo>
-                    <a:pt x="0" y="3707257"/>
+                    <a:pt x="24384000" y="3366115"/>
+                  </a:lnTo>
+                  <a:lnTo>
+                    <a:pt x="0" y="3366115"/>
                   </a:lnTo>
                   <a:close/>
                 </a:path>
@@ -11390,7 +12504,7 @@
           <p:spPr>
             <a:xfrm flipH="false" flipV="false" rot="0">
               <a:off x="0" y="0"/>
-              <a:ext cx="24409400" cy="3732657"/>
+              <a:ext cx="24409400" cy="3389183"/>
             </a:xfrm>
             <a:custGeom>
               <a:avLst/>
@@ -11399,7 +12513,7 @@
               <a:cxnLst/>
               <a:rect r="r" b="b" t="t" l="l"/>
               <a:pathLst>
-                <a:path h="3732657" w="24409400">
+                <a:path h="3389183" w="24409400">
                   <a:moveTo>
                     <a:pt x="12700" y="0"/>
                   </a:moveTo>
@@ -11408,71 +12522,71 @@
                   </a:lnTo>
                   <a:cubicBezTo>
                     <a:pt x="24403686" y="0"/>
-                    <a:pt x="24409400" y="5715"/>
-                    <a:pt x="24409400" y="12700"/>
+                    <a:pt x="24409400" y="5189"/>
+                    <a:pt x="24409400" y="11531"/>
                   </a:cubicBezTo>
                   <a:lnTo>
-                    <a:pt x="24409400" y="3719957"/>
+                    <a:pt x="24409400" y="3377646"/>
                   </a:lnTo>
                   <a:cubicBezTo>
-                    <a:pt x="24409400" y="3726942"/>
-                    <a:pt x="24403686" y="3732657"/>
-                    <a:pt x="24396700" y="3732657"/>
+                    <a:pt x="24409400" y="3383988"/>
+                    <a:pt x="24403686" y="3389183"/>
+                    <a:pt x="24396700" y="3389183"/>
                   </a:cubicBezTo>
                   <a:lnTo>
-                    <a:pt x="12700" y="3732657"/>
+                    <a:pt x="12700" y="3389183"/>
                   </a:lnTo>
                   <a:cubicBezTo>
-                    <a:pt x="5715" y="3732657"/>
-                    <a:pt x="0" y="3726942"/>
-                    <a:pt x="0" y="3719957"/>
+                    <a:pt x="5715" y="3389183"/>
+                    <a:pt x="0" y="3383988"/>
+                    <a:pt x="0" y="3377646"/>
                   </a:cubicBezTo>
                   <a:lnTo>
-                    <a:pt x="0" y="12700"/>
+                    <a:pt x="0" y="11531"/>
                   </a:lnTo>
                   <a:cubicBezTo>
-                    <a:pt x="0" y="5715"/>
+                    <a:pt x="0" y="5189"/>
                     <a:pt x="5715" y="0"/>
                     <a:pt x="12700" y="0"/>
                   </a:cubicBezTo>
                   <a:moveTo>
-                    <a:pt x="12700" y="25400"/>
+                    <a:pt x="12700" y="23063"/>
                   </a:moveTo>
                   <a:lnTo>
-                    <a:pt x="12700" y="12700"/>
-                  </a:lnTo>
-                  <a:lnTo>
-                    <a:pt x="25400" y="12700"/>
-                  </a:lnTo>
-                  <a:lnTo>
-                    <a:pt x="25400" y="3719957"/>
-                  </a:lnTo>
-                  <a:lnTo>
-                    <a:pt x="12700" y="3719957"/>
-                  </a:lnTo>
-                  <a:lnTo>
-                    <a:pt x="12700" y="3707257"/>
-                  </a:lnTo>
-                  <a:lnTo>
-                    <a:pt x="24396700" y="3707257"/>
-                  </a:lnTo>
-                  <a:lnTo>
-                    <a:pt x="24396700" y="3719957"/>
-                  </a:lnTo>
-                  <a:lnTo>
-                    <a:pt x="24384000" y="3719957"/>
-                  </a:lnTo>
-                  <a:lnTo>
-                    <a:pt x="24384000" y="12700"/>
-                  </a:lnTo>
-                  <a:lnTo>
-                    <a:pt x="24396700" y="12700"/>
-                  </a:lnTo>
-                  <a:lnTo>
-                    <a:pt x="24396700" y="25400"/>
-                  </a:lnTo>
-                  <a:lnTo>
-                    <a:pt x="12700" y="25400"/>
+                    <a:pt x="12700" y="11531"/>
+                  </a:lnTo>
+                  <a:lnTo>
+                    <a:pt x="25400" y="11531"/>
+                  </a:lnTo>
+                  <a:lnTo>
+                    <a:pt x="25400" y="3377646"/>
+                  </a:lnTo>
+                  <a:lnTo>
+                    <a:pt x="12700" y="3377646"/>
+                  </a:lnTo>
+                  <a:lnTo>
+                    <a:pt x="12700" y="3366115"/>
+                  </a:lnTo>
+                  <a:lnTo>
+                    <a:pt x="24396700" y="3366115"/>
+                  </a:lnTo>
+                  <a:lnTo>
+                    <a:pt x="24396700" y="3377646"/>
+                  </a:lnTo>
+                  <a:lnTo>
+                    <a:pt x="24384000" y="3377646"/>
+                  </a:lnTo>
+                  <a:lnTo>
+                    <a:pt x="24384000" y="11531"/>
+                  </a:lnTo>
+                  <a:lnTo>
+                    <a:pt x="24396700" y="11531"/>
+                  </a:lnTo>
+                  <a:lnTo>
+                    <a:pt x="24396700" y="23063"/>
+                  </a:lnTo>
+                  <a:lnTo>
+                    <a:pt x="12700" y="23063"/>
                   </a:lnTo>
                   <a:close/>
                 </a:path>
@@ -11547,8 +12661,8 @@
         </p:nvSpPr>
         <p:spPr>
           <a:xfrm flipH="false" flipV="false" rot="0">
-            <a:off x="2624126" y="2853322"/>
-            <a:ext cx="13263180" cy="7425730"/>
+            <a:off x="2221428" y="2872118"/>
+            <a:ext cx="13229300" cy="7414882"/>
           </a:xfrm>
           <a:custGeom>
             <a:avLst/>
@@ -11557,18 +12671,18 @@
             <a:cxnLst/>
             <a:rect r="r" b="b" t="t" l="l"/>
             <a:pathLst>
-              <a:path h="7425730" w="13263180">
+              <a:path h="7414882" w="13229300">
                 <a:moveTo>
                   <a:pt x="0" y="0"/>
                 </a:moveTo>
                 <a:lnTo>
-                  <a:pt x="13263179" y="0"/>
+                  <a:pt x="13229299" y="0"/>
                 </a:lnTo>
                 <a:lnTo>
-                  <a:pt x="13263179" y="7425731"/>
+                  <a:pt x="13229299" y="7414882"/>
                 </a:lnTo>
                 <a:lnTo>
-                  <a:pt x="0" y="7425731"/>
+                  <a:pt x="0" y="7414882"/>
                 </a:lnTo>
                 <a:lnTo>
                   <a:pt x="0" y="0"/>
@@ -11580,7 +12694,7 @@
           <a:blipFill>
             <a:blip r:embed="rId3"/>
             <a:stretch>
-              <a:fillRect l="0" t="0" r="0" b="0"/>
+              <a:fillRect l="0" t="-476" r="0" b="-476"/>
             </a:stretch>
           </a:blipFill>
         </p:spPr>
@@ -11679,9 +12793,9 @@
         <p:grpSpPr>
           <a:xfrm rot="0">
             <a:off x="-9525" y="-9525"/>
-            <a:ext cx="18307050" cy="2799450"/>
+            <a:ext cx="18307050" cy="2541844"/>
             <a:chOff x="0" y="0"/>
-            <a:chExt cx="24409400" cy="3732600"/>
+            <a:chExt cx="24409400" cy="3389126"/>
           </a:xfrm>
         </p:grpSpPr>
         <p:sp>
@@ -11692,8 +12806,8 @@
           </p:nvSpPr>
           <p:spPr>
             <a:xfrm flipH="false" flipV="false" rot="0">
-              <a:off x="12700" y="12700"/>
-              <a:ext cx="24384000" cy="3707257"/>
+              <a:off x="12700" y="11531"/>
+              <a:ext cx="24384000" cy="3366115"/>
             </a:xfrm>
             <a:custGeom>
               <a:avLst/>
@@ -11702,7 +12816,7 @@
               <a:cxnLst/>
               <a:rect r="r" b="b" t="t" l="l"/>
               <a:pathLst>
-                <a:path h="3707257" w="24384000">
+                <a:path h="3366115" w="24384000">
                   <a:moveTo>
                     <a:pt x="0" y="0"/>
                   </a:moveTo>
@@ -11710,10 +12824,10 @@
                     <a:pt x="24384000" y="0"/>
                   </a:lnTo>
                   <a:lnTo>
-                    <a:pt x="24384000" y="3707257"/>
-                  </a:lnTo>
-                  <a:lnTo>
-                    <a:pt x="0" y="3707257"/>
+                    <a:pt x="24384000" y="3366115"/>
+                  </a:lnTo>
+                  <a:lnTo>
+                    <a:pt x="0" y="3366115"/>
                   </a:lnTo>
                   <a:close/>
                 </a:path>
@@ -11733,7 +12847,7 @@
           <p:spPr>
             <a:xfrm flipH="false" flipV="false" rot="0">
               <a:off x="0" y="0"/>
-              <a:ext cx="24409400" cy="3732657"/>
+              <a:ext cx="24409400" cy="3389183"/>
             </a:xfrm>
             <a:custGeom>
               <a:avLst/>
@@ -11742,7 +12856,7 @@
               <a:cxnLst/>
               <a:rect r="r" b="b" t="t" l="l"/>
               <a:pathLst>
-                <a:path h="3732657" w="24409400">
+                <a:path h="3389183" w="24409400">
                   <a:moveTo>
                     <a:pt x="12700" y="0"/>
                   </a:moveTo>
@@ -11751,71 +12865,71 @@
                   </a:lnTo>
                   <a:cubicBezTo>
                     <a:pt x="24403686" y="0"/>
-                    <a:pt x="24409400" y="5715"/>
-                    <a:pt x="24409400" y="12700"/>
+                    <a:pt x="24409400" y="5189"/>
+                    <a:pt x="24409400" y="11531"/>
                   </a:cubicBezTo>
                   <a:lnTo>
-                    <a:pt x="24409400" y="3719957"/>
+                    <a:pt x="24409400" y="3377646"/>
                   </a:lnTo>
                   <a:cubicBezTo>
-                    <a:pt x="24409400" y="3726942"/>
-                    <a:pt x="24403686" y="3732657"/>
-                    <a:pt x="24396700" y="3732657"/>
+                    <a:pt x="24409400" y="3383988"/>
+                    <a:pt x="24403686" y="3389183"/>
+                    <a:pt x="24396700" y="3389183"/>
                   </a:cubicBezTo>
                   <a:lnTo>
-                    <a:pt x="12700" y="3732657"/>
+                    <a:pt x="12700" y="3389183"/>
                   </a:lnTo>
                   <a:cubicBezTo>
-                    <a:pt x="5715" y="3732657"/>
-                    <a:pt x="0" y="3726942"/>
-                    <a:pt x="0" y="3719957"/>
+                    <a:pt x="5715" y="3389183"/>
+                    <a:pt x="0" y="3383988"/>
+                    <a:pt x="0" y="3377646"/>
                   </a:cubicBezTo>
                   <a:lnTo>
-                    <a:pt x="0" y="12700"/>
+                    <a:pt x="0" y="11531"/>
                   </a:lnTo>
                   <a:cubicBezTo>
-                    <a:pt x="0" y="5715"/>
+                    <a:pt x="0" y="5189"/>
                     <a:pt x="5715" y="0"/>
                     <a:pt x="12700" y="0"/>
                   </a:cubicBezTo>
                   <a:moveTo>
-                    <a:pt x="12700" y="25400"/>
+                    <a:pt x="12700" y="23063"/>
                   </a:moveTo>
                   <a:lnTo>
-                    <a:pt x="12700" y="12700"/>
-                  </a:lnTo>
-                  <a:lnTo>
-                    <a:pt x="25400" y="12700"/>
-                  </a:lnTo>
-                  <a:lnTo>
-                    <a:pt x="25400" y="3719957"/>
-                  </a:lnTo>
-                  <a:lnTo>
-                    <a:pt x="12700" y="3719957"/>
-                  </a:lnTo>
-                  <a:lnTo>
-                    <a:pt x="12700" y="3707257"/>
-                  </a:lnTo>
-                  <a:lnTo>
-                    <a:pt x="24396700" y="3707257"/>
-                  </a:lnTo>
-                  <a:lnTo>
-                    <a:pt x="24396700" y="3719957"/>
-                  </a:lnTo>
-                  <a:lnTo>
-                    <a:pt x="24384000" y="3719957"/>
-                  </a:lnTo>
-                  <a:lnTo>
-                    <a:pt x="24384000" y="12700"/>
-                  </a:lnTo>
-                  <a:lnTo>
-                    <a:pt x="24396700" y="12700"/>
-                  </a:lnTo>
-                  <a:lnTo>
-                    <a:pt x="24396700" y="25400"/>
-                  </a:lnTo>
-                  <a:lnTo>
-                    <a:pt x="12700" y="25400"/>
+                    <a:pt x="12700" y="11531"/>
+                  </a:lnTo>
+                  <a:lnTo>
+                    <a:pt x="25400" y="11531"/>
+                  </a:lnTo>
+                  <a:lnTo>
+                    <a:pt x="25400" y="3377646"/>
+                  </a:lnTo>
+                  <a:lnTo>
+                    <a:pt x="12700" y="3377646"/>
+                  </a:lnTo>
+                  <a:lnTo>
+                    <a:pt x="12700" y="3366115"/>
+                  </a:lnTo>
+                  <a:lnTo>
+                    <a:pt x="24396700" y="3366115"/>
+                  </a:lnTo>
+                  <a:lnTo>
+                    <a:pt x="24396700" y="3377646"/>
+                  </a:lnTo>
+                  <a:lnTo>
+                    <a:pt x="24384000" y="3377646"/>
+                  </a:lnTo>
+                  <a:lnTo>
+                    <a:pt x="24384000" y="11531"/>
+                  </a:lnTo>
+                  <a:lnTo>
+                    <a:pt x="24396700" y="11531"/>
+                  </a:lnTo>
+                  <a:lnTo>
+                    <a:pt x="24396700" y="23063"/>
+                  </a:lnTo>
+                  <a:lnTo>
+                    <a:pt x="12700" y="23063"/>
                   </a:lnTo>
                   <a:close/>
                 </a:path>
@@ -11890,8 +13004,8 @@
         </p:nvSpPr>
         <p:spPr>
           <a:xfrm flipH="false" flipV="false" rot="0">
-            <a:off x="4022712" y="2950892"/>
-            <a:ext cx="9984133" cy="7187021"/>
+            <a:off x="1997858" y="2532319"/>
+            <a:ext cx="14292284" cy="7754681"/>
           </a:xfrm>
           <a:custGeom>
             <a:avLst/>
@@ -11900,18 +13014,18 @@
             <a:cxnLst/>
             <a:rect r="r" b="b" t="t" l="l"/>
             <a:pathLst>
-              <a:path h="7187021" w="9984133">
+              <a:path h="7754681" w="14292284">
                 <a:moveTo>
                   <a:pt x="0" y="0"/>
                 </a:moveTo>
                 <a:lnTo>
-                  <a:pt x="9984132" y="0"/>
+                  <a:pt x="14292284" y="0"/>
                 </a:lnTo>
                 <a:lnTo>
-                  <a:pt x="9984132" y="7187021"/>
+                  <a:pt x="14292284" y="7754681"/>
                 </a:lnTo>
                 <a:lnTo>
-                  <a:pt x="0" y="7187021"/>
+                  <a:pt x="0" y="7754681"/>
                 </a:lnTo>
                 <a:lnTo>
                   <a:pt x="0" y="0"/>
@@ -11923,7 +13037,7 @@
           <a:blipFill>
             <a:blip r:embed="rId3"/>
             <a:stretch>
-              <a:fillRect l="0" t="-1015" r="0" b="-1015"/>
+              <a:fillRect l="-657" t="-367" r="-657" b="0"/>
             </a:stretch>
           </a:blipFill>
         </p:spPr>
@@ -11987,6 +13101,52 @@
             </a:r>
           </a:p>
         </p:txBody>
+      </p:sp>
+      <p:sp>
+        <p:nvSpPr>
+          <p:cNvPr name="Freeform 9" id="9"/>
+          <p:cNvSpPr/>
+          <p:nvPr/>
+        </p:nvSpPr>
+        <p:spPr>
+          <a:xfrm flipH="false" flipV="false" rot="0">
+            <a:off x="2150258" y="2684719"/>
+            <a:ext cx="14292284" cy="7754681"/>
+          </a:xfrm>
+          <a:custGeom>
+            <a:avLst/>
+            <a:gdLst/>
+            <a:ahLst/>
+            <a:cxnLst/>
+            <a:rect r="r" b="b" t="t" l="l"/>
+            <a:pathLst>
+              <a:path h="7754681" w="14292284">
+                <a:moveTo>
+                  <a:pt x="0" y="0"/>
+                </a:moveTo>
+                <a:lnTo>
+                  <a:pt x="14292284" y="0"/>
+                </a:lnTo>
+                <a:lnTo>
+                  <a:pt x="14292284" y="7754681"/>
+                </a:lnTo>
+                <a:lnTo>
+                  <a:pt x="0" y="7754681"/>
+                </a:lnTo>
+                <a:lnTo>
+                  <a:pt x="0" y="0"/>
+                </a:lnTo>
+                <a:close/>
+              </a:path>
+            </a:pathLst>
+          </a:custGeom>
+          <a:blipFill>
+            <a:blip r:embed="rId3"/>
+            <a:stretch>
+              <a:fillRect l="-657" t="-367" r="-657" b="0"/>
+            </a:stretch>
+          </a:blipFill>
+        </p:spPr>
       </p:sp>
     </p:spTree>
   </p:cSld>

</xml_diff>